<commit_message>
practica 3 edicion power point o todo lo que yo quiera
</commit_message>
<xml_diff>
--- a/Parcial 1/Practica 2 parcial 1.pptx
+++ b/Parcial 1/Practica 2 parcial 1.pptx
@@ -6,9 +6,13 @@
   </p:sldMasterIdLst>
   <p:sldIdLst>
     <p:sldId id="256" r:id="rId2"/>
-    <p:sldId id="257" r:id="rId3"/>
-    <p:sldId id="258" r:id="rId4"/>
-    <p:sldId id="259" r:id="rId5"/>
+    <p:sldId id="260" r:id="rId3"/>
+    <p:sldId id="261" r:id="rId4"/>
+    <p:sldId id="262" r:id="rId5"/>
+    <p:sldId id="263" r:id="rId6"/>
+    <p:sldId id="257" r:id="rId7"/>
+    <p:sldId id="258" r:id="rId8"/>
+    <p:sldId id="259" r:id="rId9"/>
   </p:sldIdLst>
   <p:sldSz cx="12192000" cy="6858000"/>
   <p:notesSz cx="6858000" cy="9144000"/>
@@ -107,6 +111,11 @@
       </a:defRPr>
     </a:lvl9pPr>
   </p:defaultTextStyle>
+  <p:extLst>
+    <p:ext uri="{EFAFB233-063F-42B5-8137-9DF3F51BA10A}">
+      <p15:sldGuideLst xmlns:p15="http://schemas.microsoft.com/office/powerpoint/2012/main"/>
+    </p:ext>
+  </p:extLst>
 </p:presentation>
 </file>
 
@@ -241,7 +250,7 @@
           <a:p>
             <a:fld id="{56078934-687C-4CC3-A6BD-777C052E1164}" type="datetimeFigureOut">
               <a:rPr lang="es-MX" smtClean="0"/>
-              <a:t>13/02/2025</a:t>
+              <a:t>18/02/2025</a:t>
             </a:fld>
             <a:endParaRPr lang="es-MX"/>
           </a:p>
@@ -411,7 +420,7 @@
           <a:p>
             <a:fld id="{56078934-687C-4CC3-A6BD-777C052E1164}" type="datetimeFigureOut">
               <a:rPr lang="es-MX" smtClean="0"/>
-              <a:t>13/02/2025</a:t>
+              <a:t>18/02/2025</a:t>
             </a:fld>
             <a:endParaRPr lang="es-MX"/>
           </a:p>
@@ -591,7 +600,7 @@
           <a:p>
             <a:fld id="{56078934-687C-4CC3-A6BD-777C052E1164}" type="datetimeFigureOut">
               <a:rPr lang="es-MX" smtClean="0"/>
-              <a:t>13/02/2025</a:t>
+              <a:t>18/02/2025</a:t>
             </a:fld>
             <a:endParaRPr lang="es-MX"/>
           </a:p>
@@ -761,7 +770,7 @@
           <a:p>
             <a:fld id="{56078934-687C-4CC3-A6BD-777C052E1164}" type="datetimeFigureOut">
               <a:rPr lang="es-MX" smtClean="0"/>
-              <a:t>13/02/2025</a:t>
+              <a:t>18/02/2025</a:t>
             </a:fld>
             <a:endParaRPr lang="es-MX"/>
           </a:p>
@@ -1007,7 +1016,7 @@
           <a:p>
             <a:fld id="{56078934-687C-4CC3-A6BD-777C052E1164}" type="datetimeFigureOut">
               <a:rPr lang="es-MX" smtClean="0"/>
-              <a:t>13/02/2025</a:t>
+              <a:t>18/02/2025</a:t>
             </a:fld>
             <a:endParaRPr lang="es-MX"/>
           </a:p>
@@ -1239,7 +1248,7 @@
           <a:p>
             <a:fld id="{56078934-687C-4CC3-A6BD-777C052E1164}" type="datetimeFigureOut">
               <a:rPr lang="es-MX" smtClean="0"/>
-              <a:t>13/02/2025</a:t>
+              <a:t>18/02/2025</a:t>
             </a:fld>
             <a:endParaRPr lang="es-MX"/>
           </a:p>
@@ -1606,7 +1615,7 @@
           <a:p>
             <a:fld id="{56078934-687C-4CC3-A6BD-777C052E1164}" type="datetimeFigureOut">
               <a:rPr lang="es-MX" smtClean="0"/>
-              <a:t>13/02/2025</a:t>
+              <a:t>18/02/2025</a:t>
             </a:fld>
             <a:endParaRPr lang="es-MX"/>
           </a:p>
@@ -1724,7 +1733,7 @@
           <a:p>
             <a:fld id="{56078934-687C-4CC3-A6BD-777C052E1164}" type="datetimeFigureOut">
               <a:rPr lang="es-MX" smtClean="0"/>
-              <a:t>13/02/2025</a:t>
+              <a:t>18/02/2025</a:t>
             </a:fld>
             <a:endParaRPr lang="es-MX"/>
           </a:p>
@@ -1819,7 +1828,7 @@
           <a:p>
             <a:fld id="{56078934-687C-4CC3-A6BD-777C052E1164}" type="datetimeFigureOut">
               <a:rPr lang="es-MX" smtClean="0"/>
-              <a:t>13/02/2025</a:t>
+              <a:t>18/02/2025</a:t>
             </a:fld>
             <a:endParaRPr lang="es-MX"/>
           </a:p>
@@ -2096,7 +2105,7 @@
           <a:p>
             <a:fld id="{56078934-687C-4CC3-A6BD-777C052E1164}" type="datetimeFigureOut">
               <a:rPr lang="es-MX" smtClean="0"/>
-              <a:t>13/02/2025</a:t>
+              <a:t>18/02/2025</a:t>
             </a:fld>
             <a:endParaRPr lang="es-MX"/>
           </a:p>
@@ -2349,7 +2358,7 @@
           <a:p>
             <a:fld id="{56078934-687C-4CC3-A6BD-777C052E1164}" type="datetimeFigureOut">
               <a:rPr lang="es-MX" smtClean="0"/>
-              <a:t>13/02/2025</a:t>
+              <a:t>18/02/2025</a:t>
             </a:fld>
             <a:endParaRPr lang="es-MX"/>
           </a:p>
@@ -2562,7 +2571,7 @@
           <a:p>
             <a:fld id="{56078934-687C-4CC3-A6BD-777C052E1164}" type="datetimeFigureOut">
               <a:rPr lang="es-MX" smtClean="0"/>
-              <a:t>13/02/2025</a:t>
+              <a:t>18/02/2025</a:t>
             </a:fld>
             <a:endParaRPr lang="es-MX"/>
           </a:p>
@@ -3060,6 +3069,350 @@
           <a:p>
             <a:r>
               <a:rPr lang="es-MX" dirty="0" smtClean="0"/>
+              <a:t>Vivo en </a:t>
+            </a:r>
+            <a:r>
+              <a:rPr lang="es-MX" dirty="0" err="1" smtClean="0"/>
+              <a:t>culiacan</a:t>
+            </a:r>
+            <a:endParaRPr lang="es-MX" dirty="0"/>
+          </a:p>
+        </p:txBody>
+      </p:sp>
+      <p:pic>
+        <p:nvPicPr>
+          <p:cNvPr id="5" name="Marcador de contenido 4"/>
+          <p:cNvPicPr>
+            <a:picLocks noGrp="1" noChangeAspect="1"/>
+          </p:cNvPicPr>
+          <p:nvPr>
+            <p:ph idx="1"/>
+          </p:nvPr>
+        </p:nvPicPr>
+        <p:blipFill>
+          <a:blip r:embed="rId2"/>
+          <a:stretch>
+            <a:fillRect/>
+          </a:stretch>
+        </p:blipFill>
+        <p:spPr>
+          <a:xfrm>
+            <a:off x="2249023" y="1946365"/>
+            <a:ext cx="5459287" cy="4089196"/>
+          </a:xfrm>
+          <a:prstGeom prst="rect">
+            <a:avLst/>
+          </a:prstGeom>
+        </p:spPr>
+      </p:pic>
+    </p:spTree>
+    <p:extLst>
+      <p:ext uri="{BB962C8B-B14F-4D97-AF65-F5344CB8AC3E}">
+        <p14:creationId xmlns:p14="http://schemas.microsoft.com/office/powerpoint/2010/main" val="1847701341"/>
+      </p:ext>
+    </p:extLst>
+  </p:cSld>
+  <p:clrMapOvr>
+    <a:masterClrMapping/>
+  </p:clrMapOvr>
+</p:sld>
+</file>
+
+<file path=ppt/slides/slide3.xml><?xml version="1.0" encoding="utf-8"?>
+<p:sld xmlns:a="http://schemas.openxmlformats.org/drawingml/2006/main" xmlns:r="http://schemas.openxmlformats.org/officeDocument/2006/relationships" xmlns:p="http://schemas.openxmlformats.org/presentationml/2006/main">
+  <p:cSld>
+    <p:spTree>
+      <p:nvGrpSpPr>
+        <p:cNvPr id="1" name=""/>
+        <p:cNvGrpSpPr/>
+        <p:nvPr/>
+      </p:nvGrpSpPr>
+      <p:grpSpPr>
+        <a:xfrm>
+          <a:off x="0" y="0"/>
+          <a:ext cx="0" cy="0"/>
+          <a:chOff x="0" y="0"/>
+          <a:chExt cx="0" cy="0"/>
+        </a:xfrm>
+      </p:grpSpPr>
+      <p:sp>
+        <p:nvSpPr>
+          <p:cNvPr id="2" name="Título 1"/>
+          <p:cNvSpPr>
+            <a:spLocks noGrp="1"/>
+          </p:cNvSpPr>
+          <p:nvPr>
+            <p:ph type="title"/>
+          </p:nvPr>
+        </p:nvSpPr>
+        <p:spPr/>
+        <p:txBody>
+          <a:bodyPr/>
+          <a:lstStyle/>
+          <a:p>
+            <a:r>
+              <a:rPr lang="es-MX" dirty="0" smtClean="0"/>
+              <a:t>Estudio en el cetis107</a:t>
+            </a:r>
+            <a:endParaRPr lang="es-MX" dirty="0"/>
+          </a:p>
+        </p:txBody>
+      </p:sp>
+      <p:pic>
+        <p:nvPicPr>
+          <p:cNvPr id="4" name="Marcador de contenido 3"/>
+          <p:cNvPicPr>
+            <a:picLocks noGrp="1" noChangeAspect="1"/>
+          </p:cNvPicPr>
+          <p:nvPr>
+            <p:ph idx="1"/>
+          </p:nvPr>
+        </p:nvPicPr>
+        <p:blipFill>
+          <a:blip r:embed="rId2"/>
+          <a:stretch>
+            <a:fillRect/>
+          </a:stretch>
+        </p:blipFill>
+        <p:spPr>
+          <a:xfrm>
+            <a:off x="1510120" y="1690688"/>
+            <a:ext cx="3179445" cy="4891454"/>
+          </a:xfrm>
+          <a:prstGeom prst="rect">
+            <a:avLst/>
+          </a:prstGeom>
+        </p:spPr>
+      </p:pic>
+      <p:pic>
+        <p:nvPicPr>
+          <p:cNvPr id="5" name="Imagen 4"/>
+          <p:cNvPicPr>
+            <a:picLocks noChangeAspect="1"/>
+          </p:cNvPicPr>
+          <p:nvPr/>
+        </p:nvPicPr>
+        <p:blipFill>
+          <a:blip r:embed="rId3"/>
+          <a:stretch>
+            <a:fillRect/>
+          </a:stretch>
+        </p:blipFill>
+        <p:spPr>
+          <a:xfrm>
+            <a:off x="7205934" y="2749323"/>
+            <a:ext cx="2143125" cy="2143125"/>
+          </a:xfrm>
+          <a:prstGeom prst="rect">
+            <a:avLst/>
+          </a:prstGeom>
+        </p:spPr>
+      </p:pic>
+    </p:spTree>
+    <p:extLst>
+      <p:ext uri="{BB962C8B-B14F-4D97-AF65-F5344CB8AC3E}">
+        <p14:creationId xmlns:p14="http://schemas.microsoft.com/office/powerpoint/2010/main" val="3871591030"/>
+      </p:ext>
+    </p:extLst>
+  </p:cSld>
+  <p:clrMapOvr>
+    <a:masterClrMapping/>
+  </p:clrMapOvr>
+</p:sld>
+</file>
+
+<file path=ppt/slides/slide4.xml><?xml version="1.0" encoding="utf-8"?>
+<p:sld xmlns:a="http://schemas.openxmlformats.org/drawingml/2006/main" xmlns:r="http://schemas.openxmlformats.org/officeDocument/2006/relationships" xmlns:p="http://schemas.openxmlformats.org/presentationml/2006/main">
+  <p:cSld>
+    <p:spTree>
+      <p:nvGrpSpPr>
+        <p:cNvPr id="1" name=""/>
+        <p:cNvGrpSpPr/>
+        <p:nvPr/>
+      </p:nvGrpSpPr>
+      <p:grpSpPr>
+        <a:xfrm>
+          <a:off x="0" y="0"/>
+          <a:ext cx="0" cy="0"/>
+          <a:chOff x="0" y="0"/>
+          <a:chExt cx="0" cy="0"/>
+        </a:xfrm>
+      </p:grpSpPr>
+      <p:sp>
+        <p:nvSpPr>
+          <p:cNvPr id="2" name="Título 1"/>
+          <p:cNvSpPr>
+            <a:spLocks noGrp="1"/>
+          </p:cNvSpPr>
+          <p:nvPr>
+            <p:ph type="title"/>
+          </p:nvPr>
+        </p:nvSpPr>
+        <p:spPr/>
+        <p:txBody>
+          <a:bodyPr/>
+          <a:lstStyle/>
+          <a:p>
+            <a:r>
+              <a:rPr lang="es-MX" u="sng" dirty="0" smtClean="0"/>
+              <a:t>Soy niño</a:t>
+            </a:r>
+            <a:endParaRPr lang="es-MX" u="sng" dirty="0"/>
+          </a:p>
+        </p:txBody>
+      </p:sp>
+      <p:pic>
+        <p:nvPicPr>
+          <p:cNvPr id="4" name="Marcador de contenido 3"/>
+          <p:cNvPicPr>
+            <a:picLocks noGrp="1" noChangeAspect="1"/>
+          </p:cNvPicPr>
+          <p:nvPr>
+            <p:ph idx="1"/>
+          </p:nvPr>
+        </p:nvPicPr>
+        <p:blipFill>
+          <a:blip r:embed="rId2"/>
+          <a:stretch>
+            <a:fillRect/>
+          </a:stretch>
+        </p:blipFill>
+        <p:spPr>
+          <a:xfrm>
+            <a:off x="3361803" y="1690688"/>
+            <a:ext cx="3748201" cy="3748201"/>
+          </a:xfrm>
+          <a:prstGeom prst="rect">
+            <a:avLst/>
+          </a:prstGeom>
+        </p:spPr>
+      </p:pic>
+    </p:spTree>
+    <p:extLst>
+      <p:ext uri="{BB962C8B-B14F-4D97-AF65-F5344CB8AC3E}">
+        <p14:creationId xmlns:p14="http://schemas.microsoft.com/office/powerpoint/2010/main" val="4005199158"/>
+      </p:ext>
+    </p:extLst>
+  </p:cSld>
+  <p:clrMapOvr>
+    <a:masterClrMapping/>
+  </p:clrMapOvr>
+</p:sld>
+</file>
+
+<file path=ppt/slides/slide5.xml><?xml version="1.0" encoding="utf-8"?>
+<p:sld xmlns:a="http://schemas.openxmlformats.org/drawingml/2006/main" xmlns:r="http://schemas.openxmlformats.org/officeDocument/2006/relationships" xmlns:p="http://schemas.openxmlformats.org/presentationml/2006/main">
+  <p:cSld>
+    <p:spTree>
+      <p:nvGrpSpPr>
+        <p:cNvPr id="1" name=""/>
+        <p:cNvGrpSpPr/>
+        <p:nvPr/>
+      </p:nvGrpSpPr>
+      <p:grpSpPr>
+        <a:xfrm>
+          <a:off x="0" y="0"/>
+          <a:ext cx="0" cy="0"/>
+          <a:chOff x="0" y="0"/>
+          <a:chExt cx="0" cy="0"/>
+        </a:xfrm>
+      </p:grpSpPr>
+      <p:sp>
+        <p:nvSpPr>
+          <p:cNvPr id="2" name="Título 1"/>
+          <p:cNvSpPr>
+            <a:spLocks noGrp="1"/>
+          </p:cNvSpPr>
+          <p:nvPr>
+            <p:ph type="title"/>
+          </p:nvPr>
+        </p:nvSpPr>
+        <p:spPr/>
+        <p:txBody>
+          <a:bodyPr/>
+          <a:lstStyle/>
+          <a:p>
+            <a:r>
+              <a:rPr lang="es-MX" dirty="0" smtClean="0"/>
+              <a:t>Estudio programación</a:t>
+            </a:r>
+            <a:endParaRPr lang="es-MX" dirty="0"/>
+          </a:p>
+        </p:txBody>
+      </p:sp>
+      <p:pic>
+        <p:nvPicPr>
+          <p:cNvPr id="4" name="Marcador de contenido 3"/>
+          <p:cNvPicPr>
+            <a:picLocks noGrp="1" noChangeAspect="1"/>
+          </p:cNvPicPr>
+          <p:nvPr>
+            <p:ph idx="1"/>
+          </p:nvPr>
+        </p:nvPicPr>
+        <p:blipFill>
+          <a:blip r:embed="rId2"/>
+          <a:stretch>
+            <a:fillRect/>
+          </a:stretch>
+        </p:blipFill>
+        <p:spPr>
+          <a:xfrm>
+            <a:off x="2273526" y="2181498"/>
+            <a:ext cx="5389200" cy="2694600"/>
+          </a:xfrm>
+          <a:prstGeom prst="rect">
+            <a:avLst/>
+          </a:prstGeom>
+        </p:spPr>
+      </p:pic>
+    </p:spTree>
+    <p:extLst>
+      <p:ext uri="{BB962C8B-B14F-4D97-AF65-F5344CB8AC3E}">
+        <p14:creationId xmlns:p14="http://schemas.microsoft.com/office/powerpoint/2010/main" val="2198625086"/>
+      </p:ext>
+    </p:extLst>
+  </p:cSld>
+  <p:clrMapOvr>
+    <a:masterClrMapping/>
+  </p:clrMapOvr>
+</p:sld>
+</file>
+
+<file path=ppt/slides/slide6.xml><?xml version="1.0" encoding="utf-8"?>
+<p:sld xmlns:a="http://schemas.openxmlformats.org/drawingml/2006/main" xmlns:r="http://schemas.openxmlformats.org/officeDocument/2006/relationships" xmlns:p="http://schemas.openxmlformats.org/presentationml/2006/main">
+  <p:cSld>
+    <p:spTree>
+      <p:nvGrpSpPr>
+        <p:cNvPr id="1" name=""/>
+        <p:cNvGrpSpPr/>
+        <p:nvPr/>
+      </p:nvGrpSpPr>
+      <p:grpSpPr>
+        <a:xfrm>
+          <a:off x="0" y="0"/>
+          <a:ext cx="0" cy="0"/>
+          <a:chOff x="0" y="0"/>
+          <a:chExt cx="0" cy="0"/>
+        </a:xfrm>
+      </p:grpSpPr>
+      <p:sp>
+        <p:nvSpPr>
+          <p:cNvPr id="2" name="Título 1"/>
+          <p:cNvSpPr>
+            <a:spLocks noGrp="1"/>
+          </p:cNvSpPr>
+          <p:nvPr>
+            <p:ph type="title"/>
+          </p:nvPr>
+        </p:nvSpPr>
+        <p:spPr/>
+        <p:txBody>
+          <a:bodyPr/>
+          <a:lstStyle/>
+          <a:p>
+            <a:r>
+              <a:rPr lang="es-MX" dirty="0" smtClean="0"/>
               <a:t>Me gusta el minecraft</a:t>
             </a:r>
             <a:endParaRPr lang="es-MX" dirty="0"/>
@@ -3105,7 +3458,7 @@
 </p:sld>
 </file>
 
-<file path=ppt/slides/slide3.xml><?xml version="1.0" encoding="utf-8"?>
+<file path=ppt/slides/slide7.xml><?xml version="1.0" encoding="utf-8"?>
 <p:sld xmlns:a="http://schemas.openxmlformats.org/drawingml/2006/main" xmlns:r="http://schemas.openxmlformats.org/officeDocument/2006/relationships" xmlns:p="http://schemas.openxmlformats.org/presentationml/2006/main">
   <p:cSld>
     <p:spTree>
@@ -3210,7 +3563,7 @@
 </p:sld>
 </file>
 
-<file path=ppt/slides/slide4.xml><?xml version="1.0" encoding="utf-8"?>
+<file path=ppt/slides/slide8.xml><?xml version="1.0" encoding="utf-8"?>
 <p:sld xmlns:a="http://schemas.openxmlformats.org/drawingml/2006/main" xmlns:r="http://schemas.openxmlformats.org/officeDocument/2006/relationships" xmlns:p="http://schemas.openxmlformats.org/presentationml/2006/main">
   <p:cSld>
     <p:spTree>

</xml_diff>